<commit_message>
Update slides and `.zip`
</commit_message>
<xml_diff>
--- a/main-labs/basic-topics/two-computers/0105-kathara-lab_two-computers.pptx
+++ b/main-labs/basic-topics/two-computers/0105-kathara-lab_two-computers.pptx
@@ -6844,7 +6844,7 @@
           <p:nvPr>
             <p:extLst>
               <p:ext uri="{D42A27DB-BD31-4B8C-83A1-F6EECF244321}">
-                <p14:modId xmlns:p14="http://schemas.microsoft.com/office/powerpoint/2010/main" val="3332826561"/>
+                <p14:modId xmlns:p14="http://schemas.microsoft.com/office/powerpoint/2010/main" val="2941448908"/>
               </p:ext>
             </p:extLst>
           </p:nvPr>
@@ -6992,7 +6992,7 @@
                           <a:effectLst/>
                           <a:latin typeface="Tahoma" pitchFamily="34" charset="0"/>
                         </a:rPr>
-                        <a:t>1.0</a:t>
+                        <a:t>2.0</a:t>
                       </a:r>
                     </a:p>
                   </a:txBody>
@@ -7167,7 +7167,33 @@
                           <a:effectLst/>
                           <a:latin typeface="Tahoma" pitchFamily="34" charset="0"/>
                         </a:rPr>
-                        <a:t>L. Ariemma</a:t>
+                        <a:t>L. </a:t>
+                      </a:r>
+                      <a:r>
+                        <a:rPr kumimoji="0" lang="en-US" sz="1600" b="0" i="0" u="none" strike="noStrike" cap="none" normalizeH="0" baseline="0" dirty="0" err="1">
+                          <a:ln>
+                            <a:noFill/>
+                          </a:ln>
+                          <a:solidFill>
+                            <a:schemeClr val="tx1"/>
+                          </a:solidFill>
+                          <a:effectLst/>
+                          <a:latin typeface="Tahoma" pitchFamily="34" charset="0"/>
+                        </a:rPr>
+                        <a:t>Ariemma</a:t>
+                      </a:r>
+                      <a:r>
+                        <a:rPr kumimoji="0" lang="en-US" sz="1600" b="0" i="0" u="none" strike="noStrike" cap="none" normalizeH="0" baseline="0" dirty="0">
+                          <a:ln>
+                            <a:noFill/>
+                          </a:ln>
+                          <a:solidFill>
+                            <a:schemeClr val="tx1"/>
+                          </a:solidFill>
+                          <a:effectLst/>
+                          <a:latin typeface="Tahoma" pitchFamily="34" charset="0"/>
+                        </a:rPr>
+                        <a:t>, T. Caiazzi</a:t>
                       </a:r>
                     </a:p>
                   </a:txBody>
@@ -43420,6 +43446,26 @@
 </file>
 
 <file path=customXml/item1.xml><?xml version="1.0" encoding="utf-8"?>
+<?mso-contentType ?>
+<FormTemplates xmlns="http://schemas.microsoft.com/sharepoint/v3/contenttype/forms">
+  <Display>DocumentLibraryForm</Display>
+  <Edit>DocumentLibraryForm</Edit>
+  <New>DocumentLibraryForm</New>
+</FormTemplates>
+</file>
+
+<file path=customXml/item2.xml><?xml version="1.0" encoding="utf-8"?>
+<p:properties xmlns:p="http://schemas.microsoft.com/office/2006/metadata/properties" xmlns:xsi="http://www.w3.org/2001/XMLSchema-instance" xmlns:pc="http://schemas.microsoft.com/office/infopath/2007/PartnerControls">
+  <documentManagement>
+    <TaxCatchAll xmlns="70582509-6503-4e16-ac53-25dcf1924cfe" xsi:nil="true"/>
+    <lcf76f155ced4ddcb4097134ff3c332f xmlns="faf22b50-f0a0-4d09-82e4-8fc7d61b3459">
+      <Terms xmlns="http://schemas.microsoft.com/office/infopath/2007/PartnerControls"/>
+    </lcf76f155ced4ddcb4097134ff3c332f>
+  </documentManagement>
+</p:properties>
+</file>
+
+<file path=customXml/item3.xml><?xml version="1.0" encoding="utf-8"?>
 <ct:contentTypeSchema xmlns:ct="http://schemas.microsoft.com/office/2006/metadata/contentType" xmlns:ma="http://schemas.microsoft.com/office/2006/metadata/properties/metaAttributes" ct:_="" ma:_="" ma:contentTypeName="Document" ma:contentTypeID="0x0101001C5B3E3AE4FA4C4F9C1F8597543882A5" ma:contentTypeVersion="17" ma:contentTypeDescription="Create a new document." ma:contentTypeScope="" ma:versionID="4815d3abbfc0877e78553e5fbd222dd0">
   <xsd:schema xmlns:xsd="http://www.w3.org/2001/XMLSchema" xmlns:xs="http://www.w3.org/2001/XMLSchema" xmlns:p="http://schemas.microsoft.com/office/2006/metadata/properties" xmlns:ns2="faf22b50-f0a0-4d09-82e4-8fc7d61b3459" xmlns:ns3="70582509-6503-4e16-ac53-25dcf1924cfe" targetNamespace="http://schemas.microsoft.com/office/2006/metadata/properties" ma:root="true" ma:fieldsID="c30c814db75800452b5622f0094398ee" ns2:_="" ns3:_="">
     <xsd:import namespace="faf22b50-f0a0-4d09-82e4-8fc7d61b3459"/>
@@ -43662,27 +43708,26 @@
 </ct:contentTypeSchema>
 </file>
 
-<file path=customXml/item2.xml><?xml version="1.0" encoding="utf-8"?>
-<p:properties xmlns:p="http://schemas.microsoft.com/office/2006/metadata/properties" xmlns:xsi="http://www.w3.org/2001/XMLSchema-instance" xmlns:pc="http://schemas.microsoft.com/office/infopath/2007/PartnerControls">
-  <documentManagement>
-    <TaxCatchAll xmlns="70582509-6503-4e16-ac53-25dcf1924cfe" xsi:nil="true"/>
-    <lcf76f155ced4ddcb4097134ff3c332f xmlns="faf22b50-f0a0-4d09-82e4-8fc7d61b3459">
-      <Terms xmlns="http://schemas.microsoft.com/office/infopath/2007/PartnerControls"/>
-    </lcf76f155ced4ddcb4097134ff3c332f>
-  </documentManagement>
-</p:properties>
+<file path=customXml/itemProps1.xml><?xml version="1.0" encoding="utf-8"?>
+<ds:datastoreItem xmlns:ds="http://schemas.openxmlformats.org/officeDocument/2006/customXml" ds:itemID="{9B9C3EC7-27AC-4C8D-85A7-50A0B101EB84}">
+  <ds:schemaRefs>
+    <ds:schemaRef ds:uri="http://schemas.microsoft.com/sharepoint/v3/contenttype/forms"/>
+  </ds:schemaRefs>
+</ds:datastoreItem>
 </file>
 
-<file path=customXml/item3.xml><?xml version="1.0" encoding="utf-8"?>
-<?mso-contentType ?>
-<FormTemplates xmlns="http://schemas.microsoft.com/sharepoint/v3/contenttype/forms">
-  <Display>DocumentLibraryForm</Display>
-  <Edit>DocumentLibraryForm</Edit>
-  <New>DocumentLibraryForm</New>
-</FormTemplates>
+<file path=customXml/itemProps2.xml><?xml version="1.0" encoding="utf-8"?>
+<ds:datastoreItem xmlns:ds="http://schemas.openxmlformats.org/officeDocument/2006/customXml" ds:itemID="{210698B1-0B92-4468-8E4C-F577BE605DE6}">
+  <ds:schemaRefs>
+    <ds:schemaRef ds:uri="http://schemas.microsoft.com/office/2006/metadata/properties"/>
+    <ds:schemaRef ds:uri="http://schemas.microsoft.com/office/infopath/2007/PartnerControls"/>
+    <ds:schemaRef ds:uri="70582509-6503-4e16-ac53-25dcf1924cfe"/>
+    <ds:schemaRef ds:uri="faf22b50-f0a0-4d09-82e4-8fc7d61b3459"/>
+  </ds:schemaRefs>
+</ds:datastoreItem>
 </file>
 
-<file path=customXml/itemProps1.xml><?xml version="1.0" encoding="utf-8"?>
+<file path=customXml/itemProps3.xml><?xml version="1.0" encoding="utf-8"?>
 <ds:datastoreItem xmlns:ds="http://schemas.openxmlformats.org/officeDocument/2006/customXml" ds:itemID="{597CEDAA-0CDC-486F-A510-CFDFA8B4F222}">
   <ds:schemaRefs>
     <ds:schemaRef ds:uri="http://schemas.microsoft.com/office/2006/metadata/contentType"/>
@@ -43699,23 +43744,4 @@
     <ds:schemaRef ds:uri="http://schemas.microsoft.com/internal/obd"/>
   </ds:schemaRefs>
 </ds:datastoreItem>
-</file>
-
-<file path=customXml/itemProps2.xml><?xml version="1.0" encoding="utf-8"?>
-<ds:datastoreItem xmlns:ds="http://schemas.openxmlformats.org/officeDocument/2006/customXml" ds:itemID="{210698B1-0B92-4468-8E4C-F577BE605DE6}">
-  <ds:schemaRefs>
-    <ds:schemaRef ds:uri="http://schemas.microsoft.com/office/2006/metadata/properties"/>
-    <ds:schemaRef ds:uri="http://schemas.microsoft.com/office/infopath/2007/PartnerControls"/>
-    <ds:schemaRef ds:uri="70582509-6503-4e16-ac53-25dcf1924cfe"/>
-    <ds:schemaRef ds:uri="faf22b50-f0a0-4d09-82e4-8fc7d61b3459"/>
-  </ds:schemaRefs>
-</ds:datastoreItem>
-</file>
-
-<file path=customXml/itemProps3.xml><?xml version="1.0" encoding="utf-8"?>
-<ds:datastoreItem xmlns:ds="http://schemas.openxmlformats.org/officeDocument/2006/customXml" ds:itemID="{9B9C3EC7-27AC-4C8D-85A7-50A0B101EB84}">
-  <ds:schemaRefs>
-    <ds:schemaRef ds:uri="http://schemas.microsoft.com/sharepoint/v3/contenttype/forms"/>
-  </ds:schemaRefs>
-</ds:datastoreItem>
 </file>
</xml_diff>

<commit_message>
Update slides and pdf files
</commit_message>
<xml_diff>
--- a/main-labs/basic-topics/two-computers/0105-kathara-lab_two-computers.pptx
+++ b/main-labs/basic-topics/two-computers/0105-kathara-lab_two-computers.pptx
@@ -3930,7 +3930,7 @@
             </a:pPr>
             <a:r>
               <a:rPr lang="en-US"/>
-              <a:t>last update: Oct 2023</a:t>
+              <a:t>last update: Sept 2024</a:t>
             </a:r>
             <a:endParaRPr lang="it-IT"/>
           </a:p>
@@ -4120,7 +4120,7 @@
             </a:pPr>
             <a:r>
               <a:rPr lang="en-US"/>
-              <a:t>last update: Oct 2023</a:t>
+              <a:t>last update: Sept 2024</a:t>
             </a:r>
             <a:endParaRPr lang="it-IT"/>
           </a:p>
@@ -4256,7 +4256,7 @@
             </a:pPr>
             <a:r>
               <a:rPr lang="en-US"/>
-              <a:t>last update: Oct 2023</a:t>
+              <a:t>last update: Sept 2024</a:t>
             </a:r>
             <a:endParaRPr lang="it-IT"/>
           </a:p>
@@ -4483,7 +4483,7 @@
             </a:pPr>
             <a:r>
               <a:rPr lang="en-US"/>
-              <a:t>last update: Oct 2023</a:t>
+              <a:t>last update: Sept 2024</a:t>
             </a:r>
             <a:endParaRPr lang="it-IT"/>
           </a:p>
@@ -4698,7 +4698,7 @@
             </a:pPr>
             <a:r>
               <a:rPr lang="en-US"/>
-              <a:t>last update: Oct 2023</a:t>
+              <a:t>last update: Sept 2024</a:t>
             </a:r>
             <a:endParaRPr lang="it-IT"/>
           </a:p>
@@ -4996,7 +4996,7 @@
             </a:pPr>
             <a:r>
               <a:rPr lang="en-US"/>
-              <a:t>last update: Oct 2023</a:t>
+              <a:t>last update: Sept 2024</a:t>
             </a:r>
             <a:endParaRPr lang="it-IT"/>
           </a:p>
@@ -5124,7 +5124,7 @@
             </a:pPr>
             <a:r>
               <a:rPr lang="en-US"/>
-              <a:t>last update: Oct 2023</a:t>
+              <a:t>last update: Sept 2024</a:t>
             </a:r>
             <a:endParaRPr lang="it-IT"/>
           </a:p>
@@ -5229,7 +5229,7 @@
             </a:pPr>
             <a:r>
               <a:rPr lang="en-US"/>
-              <a:t>last update: Oct 2023</a:t>
+              <a:t>last update: Sept 2024</a:t>
             </a:r>
             <a:endParaRPr lang="it-IT"/>
           </a:p>
@@ -5516,7 +5516,7 @@
             </a:pPr>
             <a:r>
               <a:rPr lang="en-US"/>
-              <a:t>last update: Oct 2023</a:t>
+              <a:t>last update: Sept 2024</a:t>
             </a:r>
             <a:endParaRPr lang="it-IT"/>
           </a:p>
@@ -5784,7 +5784,7 @@
             </a:pPr>
             <a:r>
               <a:rPr lang="en-US"/>
-              <a:t>last update: Oct 2023</a:t>
+              <a:t>last update: Sept 2024</a:t>
             </a:r>
             <a:endParaRPr lang="it-IT"/>
           </a:p>
@@ -6073,7 +6073,7 @@
             </a:pPr>
             <a:r>
               <a:rPr lang="en-US"/>
-              <a:t>last update: Oct 2023</a:t>
+              <a:t>last update: Sept 2024</a:t>
             </a:r>
             <a:endParaRPr lang="it-IT"/>
           </a:p>
@@ -8070,7 +8070,7 @@
             </a:pPr>
             <a:r>
               <a:rPr lang="en-US"/>
-              <a:t>last update: Oct 2023</a:t>
+              <a:t>last update: Sept 2024</a:t>
             </a:r>
             <a:endParaRPr lang="it-IT"/>
           </a:p>
@@ -8274,7 +8274,7 @@
             </a:pPr>
             <a:r>
               <a:rPr lang="en-US"/>
-              <a:t>last update: Oct 2023</a:t>
+              <a:t>last update: Sept 2024</a:t>
             </a:r>
             <a:endParaRPr lang="it-IT"/>
           </a:p>
@@ -8470,7 +8470,7 @@
             </a:pPr>
             <a:r>
               <a:rPr lang="en-US"/>
-              <a:t>last update: Oct 2023</a:t>
+              <a:t>last update: Sept 2024</a:t>
             </a:r>
             <a:endParaRPr lang="it-IT"/>
           </a:p>
@@ -8591,7 +8591,7 @@
             </a:pPr>
             <a:r>
               <a:rPr lang="en-US"/>
-              <a:t>last update: Oct 2023</a:t>
+              <a:t>last update: Sept 2024</a:t>
             </a:r>
             <a:endParaRPr lang="it-IT"/>
           </a:p>
@@ -10363,7 +10363,7 @@
             </a:pPr>
             <a:r>
               <a:rPr lang="en-US"/>
-              <a:t>last update: Oct 2023</a:t>
+              <a:t>last update: Sept 2024</a:t>
             </a:r>
             <a:endParaRPr lang="it-IT"/>
           </a:p>
@@ -10556,7 +10556,7 @@
             </a:pPr>
             <a:r>
               <a:rPr lang="en-US"/>
-              <a:t>last update: Oct 2023</a:t>
+              <a:t>last update: Sept 2024</a:t>
             </a:r>
             <a:endParaRPr lang="it-IT"/>
           </a:p>
@@ -10721,7 +10721,7 @@
             </a:pPr>
             <a:r>
               <a:rPr lang="en-US"/>
-              <a:t>last update: Oct 2023</a:t>
+              <a:t>last update: Sept 2024</a:t>
             </a:r>
             <a:endParaRPr lang="it-IT"/>
           </a:p>
@@ -12628,7 +12628,7 @@
             </a:pPr>
             <a:r>
               <a:rPr lang="en-US"/>
-              <a:t>last update: Oct 2023</a:t>
+              <a:t>last update: Sept 2024</a:t>
             </a:r>
             <a:endParaRPr lang="it-IT"/>
           </a:p>
@@ -13196,7 +13196,7 @@
             </a:pPr>
             <a:r>
               <a:rPr lang="en-US"/>
-              <a:t>last update: Oct 2023</a:t>
+              <a:t>last update: Sept 2024</a:t>
             </a:r>
             <a:endParaRPr lang="it-IT"/>
           </a:p>
@@ -14858,7 +14858,7 @@
             </a:pPr>
             <a:r>
               <a:rPr lang="en-US"/>
-              <a:t>last update: Oct 2023</a:t>
+              <a:t>last update: Sept 2024</a:t>
             </a:r>
             <a:endParaRPr lang="it-IT"/>
           </a:p>
@@ -16268,10 +16268,10 @@
               <a:defRPr/>
             </a:pPr>
             <a:r>
-              <a:rPr lang="en-US"/>
-              <a:t>last update: Oct 2023</a:t>
+              <a:rPr lang="en-US" dirty="0"/>
+              <a:t>last update: Sept 2024</a:t>
             </a:r>
-            <a:endParaRPr lang="it-IT"/>
+            <a:endParaRPr lang="it-IT" dirty="0"/>
           </a:p>
         </p:txBody>
       </p:sp>
@@ -16592,7 +16592,7 @@
             </a:pPr>
             <a:r>
               <a:rPr lang="en-US"/>
-              <a:t>last update: Oct 2023</a:t>
+              <a:t>last update: Sept 2024</a:t>
             </a:r>
             <a:endParaRPr lang="it-IT"/>
           </a:p>
@@ -16778,7 +16778,7 @@
             </a:pPr>
             <a:r>
               <a:rPr lang="en-US"/>
-              <a:t>last update: Oct 2023</a:t>
+              <a:t>last update: Sept 2024</a:t>
             </a:r>
             <a:endParaRPr lang="it-IT"/>
           </a:p>
@@ -16940,7 +16940,7 @@
             </a:pPr>
             <a:r>
               <a:rPr lang="en-US"/>
-              <a:t>last update: Oct 2023</a:t>
+              <a:t>last update: Sept 2024</a:t>
             </a:r>
             <a:endParaRPr lang="it-IT"/>
           </a:p>
@@ -17103,7 +17103,7 @@
             </a:pPr>
             <a:r>
               <a:rPr lang="en-US"/>
-              <a:t>last update: Oct 2023</a:t>
+              <a:t>last update: Sept 2024</a:t>
             </a:r>
             <a:endParaRPr lang="it-IT"/>
           </a:p>
@@ -17287,7 +17287,7 @@
             </a:pPr>
             <a:r>
               <a:rPr lang="en-US"/>
-              <a:t>last update: Oct 2023</a:t>
+              <a:t>last update: Sept 2024</a:t>
             </a:r>
             <a:endParaRPr lang="it-IT"/>
           </a:p>
@@ -17468,7 +17468,7 @@
             </a:pPr>
             <a:r>
               <a:rPr lang="en-US"/>
-              <a:t>last update: Oct 2023</a:t>
+              <a:t>last update: Sept 2024</a:t>
             </a:r>
             <a:endParaRPr lang="it-IT"/>
           </a:p>
@@ -19207,7 +19207,7 @@
             </a:pPr>
             <a:r>
               <a:rPr lang="en-US"/>
-              <a:t>last update: Oct 2023</a:t>
+              <a:t>last update: Sept 2024</a:t>
             </a:r>
             <a:endParaRPr lang="it-IT"/>
           </a:p>
@@ -19878,7 +19878,7 @@
             </a:pPr>
             <a:r>
               <a:rPr lang="en-US"/>
-              <a:t>last update: Oct 2023</a:t>
+              <a:t>last update: Sept 2024</a:t>
             </a:r>
             <a:endParaRPr lang="it-IT"/>
           </a:p>
@@ -20039,7 +20039,7 @@
             </a:pPr>
             <a:r>
               <a:rPr lang="en-US"/>
-              <a:t>last update: Oct 2023</a:t>
+              <a:t>last update: Sept 2024</a:t>
             </a:r>
             <a:endParaRPr lang="it-IT"/>
           </a:p>
@@ -24842,7 +24842,7 @@
             </a:pPr>
             <a:r>
               <a:rPr lang="en-US"/>
-              <a:t>last update: Oct 2023</a:t>
+              <a:t>last update: Sept 2024</a:t>
             </a:r>
             <a:endParaRPr lang="it-IT"/>
           </a:p>
@@ -26584,7 +26584,7 @@
             </a:pPr>
             <a:r>
               <a:rPr lang="en-US"/>
-              <a:t>last update: Oct 2023</a:t>
+              <a:t>last update: Sept 2024</a:t>
             </a:r>
             <a:endParaRPr lang="it-IT"/>
           </a:p>
@@ -31266,7 +31266,7 @@
             </a:pPr>
             <a:r>
               <a:rPr lang="en-US"/>
-              <a:t>last update: Oct 2023</a:t>
+              <a:t>last update: Sept 2024</a:t>
             </a:r>
             <a:endParaRPr lang="it-IT"/>
           </a:p>
@@ -36442,7 +36442,7 @@
             </a:pPr>
             <a:r>
               <a:rPr lang="en-US"/>
-              <a:t>last update: Oct 2023</a:t>
+              <a:t>last update: Sept 2024</a:t>
             </a:r>
             <a:endParaRPr lang="it-IT"/>
           </a:p>
@@ -36620,7 +36620,7 @@
             </a:pPr>
             <a:r>
               <a:rPr lang="en-US"/>
-              <a:t>last update: Oct 2023</a:t>
+              <a:t>last update: Sept 2024</a:t>
             </a:r>
             <a:endParaRPr lang="it-IT"/>
           </a:p>
@@ -36814,7 +36814,7 @@
             </a:pPr>
             <a:r>
               <a:rPr lang="en-US"/>
-              <a:t>last update: Oct 2023</a:t>
+              <a:t>last update: Sept 2024</a:t>
             </a:r>
             <a:endParaRPr lang="it-IT"/>
           </a:p>
@@ -37009,7 +37009,7 @@
             </a:pPr>
             <a:r>
               <a:rPr lang="en-US"/>
-              <a:t>last update: Oct 2023</a:t>
+              <a:t>last update: Sept 2024</a:t>
             </a:r>
             <a:endParaRPr lang="it-IT"/>
           </a:p>
@@ -37197,7 +37197,7 @@
             </a:pPr>
             <a:r>
               <a:rPr lang="en-US"/>
-              <a:t>last update: Oct 2023</a:t>
+              <a:t>last update: Sept 2024</a:t>
             </a:r>
             <a:endParaRPr lang="it-IT"/>
           </a:p>
@@ -37382,7 +37382,7 @@
             </a:pPr>
             <a:r>
               <a:rPr lang="en-US"/>
-              <a:t>last update: Oct 2023</a:t>
+              <a:t>last update: Sept 2024</a:t>
             </a:r>
             <a:endParaRPr lang="it-IT"/>
           </a:p>
@@ -37558,7 +37558,7 @@
             </a:pPr>
             <a:r>
               <a:rPr lang="en-US"/>
-              <a:t>last update: Oct 2023</a:t>
+              <a:t>last update: Sept 2024</a:t>
             </a:r>
             <a:endParaRPr lang="it-IT"/>
           </a:p>
@@ -38545,7 +38545,7 @@
             </a:pPr>
             <a:r>
               <a:rPr lang="en-US"/>
-              <a:t>last update: Oct 2023</a:t>
+              <a:t>last update: Sept 2024</a:t>
             </a:r>
             <a:endParaRPr lang="it-IT"/>
           </a:p>
@@ -39768,7 +39768,7 @@
             </a:pPr>
             <a:r>
               <a:rPr lang="en-US"/>
-              <a:t>last update: Oct 2023</a:t>
+              <a:t>last update: Sept 2024</a:t>
             </a:r>
             <a:endParaRPr lang="it-IT"/>
           </a:p>
@@ -39968,7 +39968,7 @@
             </a:pPr>
             <a:r>
               <a:rPr lang="en-US" altLang="it-IT"/>
-              <a:t>last update: Oct 2023</a:t>
+              <a:t>last update: Sept 2024</a:t>
             </a:r>
             <a:endParaRPr lang="it-IT" altLang="it-IT"/>
           </a:p>
@@ -41812,7 +41812,7 @@
             </a:pPr>
             <a:r>
               <a:rPr lang="en-US"/>
-              <a:t>last update: Oct 2023</a:t>
+              <a:t>last update: Sept 2024</a:t>
             </a:r>
             <a:endParaRPr lang="it-IT"/>
           </a:p>
@@ -41990,7 +41990,7 @@
             </a:pPr>
             <a:r>
               <a:rPr lang="en-US"/>
-              <a:t>last update: Oct 2023</a:t>
+              <a:t>last update: Sept 2024</a:t>
             </a:r>
             <a:endParaRPr lang="it-IT"/>
           </a:p>
@@ -43446,15 +43446,6 @@
 </file>
 
 <file path=customXml/item1.xml><?xml version="1.0" encoding="utf-8"?>
-<?mso-contentType ?>
-<FormTemplates xmlns="http://schemas.microsoft.com/sharepoint/v3/contenttype/forms">
-  <Display>DocumentLibraryForm</Display>
-  <Edit>DocumentLibraryForm</Edit>
-  <New>DocumentLibraryForm</New>
-</FormTemplates>
-</file>
-
-<file path=customXml/item2.xml><?xml version="1.0" encoding="utf-8"?>
 <p:properties xmlns:p="http://schemas.microsoft.com/office/2006/metadata/properties" xmlns:xsi="http://www.w3.org/2001/XMLSchema-instance" xmlns:pc="http://schemas.microsoft.com/office/infopath/2007/PartnerControls">
   <documentManagement>
     <TaxCatchAll xmlns="70582509-6503-4e16-ac53-25dcf1924cfe" xsi:nil="true"/>
@@ -43463,6 +43454,15 @@
     </lcf76f155ced4ddcb4097134ff3c332f>
   </documentManagement>
 </p:properties>
+</file>
+
+<file path=customXml/item2.xml><?xml version="1.0" encoding="utf-8"?>
+<?mso-contentType ?>
+<FormTemplates xmlns="http://schemas.microsoft.com/sharepoint/v3/contenttype/forms">
+  <Display>DocumentLibraryForm</Display>
+  <Edit>DocumentLibraryForm</Edit>
+  <New>DocumentLibraryForm</New>
+</FormTemplates>
 </file>
 
 <file path=customXml/item3.xml><?xml version="1.0" encoding="utf-8"?>
@@ -43709,20 +43709,20 @@
 </file>
 
 <file path=customXml/itemProps1.xml><?xml version="1.0" encoding="utf-8"?>
-<ds:datastoreItem xmlns:ds="http://schemas.openxmlformats.org/officeDocument/2006/customXml" ds:itemID="{9B9C3EC7-27AC-4C8D-85A7-50A0B101EB84}">
-  <ds:schemaRefs>
-    <ds:schemaRef ds:uri="http://schemas.microsoft.com/sharepoint/v3/contenttype/forms"/>
-  </ds:schemaRefs>
-</ds:datastoreItem>
-</file>
-
-<file path=customXml/itemProps2.xml><?xml version="1.0" encoding="utf-8"?>
 <ds:datastoreItem xmlns:ds="http://schemas.openxmlformats.org/officeDocument/2006/customXml" ds:itemID="{210698B1-0B92-4468-8E4C-F577BE605DE6}">
   <ds:schemaRefs>
     <ds:schemaRef ds:uri="http://schemas.microsoft.com/office/2006/metadata/properties"/>
     <ds:schemaRef ds:uri="http://schemas.microsoft.com/office/infopath/2007/PartnerControls"/>
     <ds:schemaRef ds:uri="70582509-6503-4e16-ac53-25dcf1924cfe"/>
     <ds:schemaRef ds:uri="faf22b50-f0a0-4d09-82e4-8fc7d61b3459"/>
+  </ds:schemaRefs>
+</ds:datastoreItem>
+</file>
+
+<file path=customXml/itemProps2.xml><?xml version="1.0" encoding="utf-8"?>
+<ds:datastoreItem xmlns:ds="http://schemas.openxmlformats.org/officeDocument/2006/customXml" ds:itemID="{9B9C3EC7-27AC-4C8D-85A7-50A0B101EB84}">
+  <ds:schemaRefs>
+    <ds:schemaRef ds:uri="http://schemas.microsoft.com/sharepoint/v3/contenttype/forms"/>
   </ds:schemaRefs>
 </ds:datastoreItem>
 </file>

</xml_diff>